<commit_message>
Quick updates before keynotes
</commit_message>
<xml_diff>
--- a/Ignite 2017 recap.pptx
+++ b/Ignite 2017 recap.pptx
@@ -5,13 +5,18 @@
     <p:sldMasterId id="2147483660" r:id="rId1"/>
   </p:sldMasterIdLst>
   <p:notesMasterIdLst>
-    <p:notesMasterId r:id="rId6"/>
+    <p:notesMasterId r:id="rId11"/>
   </p:notesMasterIdLst>
   <p:sldIdLst>
     <p:sldId id="257" r:id="rId2"/>
     <p:sldId id="258" r:id="rId3"/>
     <p:sldId id="259" r:id="rId4"/>
     <p:sldId id="260" r:id="rId5"/>
+    <p:sldId id="261" r:id="rId6"/>
+    <p:sldId id="262" r:id="rId7"/>
+    <p:sldId id="265" r:id="rId8"/>
+    <p:sldId id="263" r:id="rId9"/>
+    <p:sldId id="264" r:id="rId10"/>
   </p:sldIdLst>
   <p:sldSz cx="12192000" cy="6858000"/>
   <p:notesSz cx="6858000" cy="9144000"/>
@@ -122,21 +127,41 @@
           </p14:sldIdLst>
         </p14:section>
         <p14:section name="Keynotes" id="{DBBBF289-3294-4EFF-8EE5-3000638E5683}">
-          <p14:sldIdLst/>
+          <p14:sldIdLst>
+            <p14:sldId id="261"/>
+          </p14:sldIdLst>
         </p14:section>
         <p14:section name="Microsoft Azure" id="{B2F8DDBB-F878-405A-99A4-E822679C953E}">
-          <p14:sldIdLst/>
+          <p14:sldIdLst>
+            <p14:sldId id="262"/>
+          </p14:sldIdLst>
+        </p14:section>
+        <p14:section name="AI and IoT" id="{B923BDC2-C400-4B10-872B-58DB6A508A62}">
+          <p14:sldIdLst>
+            <p14:sldId id="265"/>
+          </p14:sldIdLst>
         </p14:section>
         <p14:section name="Office 365" id="{974F3CBE-FC13-4218-BE80-CB0CE96AEDC4}">
-          <p14:sldIdLst/>
+          <p14:sldIdLst>
+            <p14:sldId id="263"/>
+          </p14:sldIdLst>
         </p14:section>
         <p14:section name="Windows" id="{A7BB4C13-E438-4E75-ADBE-73364242ADD9}">
-          <p14:sldIdLst/>
+          <p14:sldIdLst>
+            <p14:sldId id="264"/>
+          </p14:sldIdLst>
         </p14:section>
       </p14:sectionLst>
     </p:ext>
+    <p:ext uri="{EFAFB233-063F-42B5-8137-9DF3F51BA10A}">
+      <p15:sldGuideLst xmlns:p15="http://schemas.microsoft.com/office/powerpoint/2012/main"/>
+    </p:ext>
   </p:extLst>
 </p:presentation>
+</file>
+
+<file path=ppt/revisionInfo.xml><?xml version="1.0" encoding="utf-8"?>
+<p1510:revInfo xmlns:a="http://schemas.openxmlformats.org/drawingml/2006/main" xmlns:r="http://schemas.openxmlformats.org/officeDocument/2006/relationships" xmlns:p1510="http://schemas.microsoft.com/office/powerpoint/2015/10/main"/>
 </file>
 
 <file path=ppt/notesMasters/notesMaster1.xml><?xml version="1.0" encoding="utf-8"?>
@@ -221,7 +246,7 @@
           <a:p>
             <a:fld id="{AD87C654-A299-4131-AC0E-6A7DF5FB2E58}" type="datetimeFigureOut">
               <a:rPr lang="en-GB" smtClean="0"/>
-              <a:t>20/09/2017</a:t>
+              <a:t>24/09/2017</a:t>
             </a:fld>
             <a:endParaRPr lang="en-GB"/>
           </a:p>
@@ -3161,28 +3186,8 @@
           <a:lstStyle/>
           <a:p>
             <a:r>
-              <a:rPr lang="fi-FI" sz="4000" dirty="0"/>
-              <a:t>A </a:t>
-            </a:r>
-            <a:r>
-              <a:rPr lang="fi-FI" sz="4000" dirty="0" err="1"/>
-              <a:t>major</a:t>
-            </a:r>
-            <a:r>
-              <a:rPr lang="fi-FI" sz="4000" dirty="0"/>
-              <a:t> </a:t>
-            </a:r>
-            <a:r>
-              <a:rPr lang="fi-FI" sz="4000" dirty="0" err="1"/>
-              <a:t>yearly</a:t>
-            </a:r>
-            <a:r>
-              <a:rPr lang="fi-FI" sz="4000" dirty="0"/>
-              <a:t> </a:t>
-            </a:r>
-            <a:r>
-              <a:rPr lang="fi-FI" sz="4000" dirty="0" err="1"/>
-              <a:t>event</a:t>
+              <a:rPr lang="fi-FI" sz="4000"/>
+              <a:t>Biggest Microsoft event of the year</a:t>
             </a:r>
             <a:endParaRPr lang="en-GB" sz="4000" dirty="0"/>
           </a:p>
@@ -3266,33 +3271,22 @@
         <p:spPr>
           <a:xfrm>
             <a:off x="136635" y="1655888"/>
-            <a:ext cx="5640150" cy="4752532"/>
+            <a:ext cx="11701328" cy="4752532"/>
           </a:xfrm>
         </p:spPr>
         <p:txBody>
           <a:bodyPr>
-            <a:normAutofit lnSpcReduction="10000"/>
+            <a:normAutofit fontScale="92500" lnSpcReduction="10000"/>
           </a:bodyPr>
           <a:lstStyle/>
           <a:p>
             <a:r>
+              <a:rPr lang="fi-FI" sz="2800"/>
+              <a:t>5 days, over </a:t>
+            </a:r>
+            <a:r>
               <a:rPr lang="fi-FI" sz="2800" dirty="0"/>
-              <a:t>4 </a:t>
-            </a:r>
-            <a:r>
-              <a:rPr lang="fi-FI" sz="2800" dirty="0" err="1"/>
-              <a:t>days</a:t>
-            </a:r>
-            <a:endParaRPr lang="fi-FI" sz="2800" dirty="0"/>
-          </a:p>
-          <a:p>
-            <a:r>
-              <a:rPr lang="fi-FI" sz="2800" dirty="0" err="1"/>
-              <a:t>Over</a:t>
-            </a:r>
-            <a:r>
-              <a:rPr lang="fi-FI" sz="2800" dirty="0"/>
-              <a:t> 900 </a:t>
+              <a:t>900 </a:t>
             </a:r>
             <a:r>
               <a:rPr lang="fi-FI" sz="2800" dirty="0" err="1"/>
@@ -3324,60 +3318,68 @@
             </a:r>
             <a:r>
               <a:rPr lang="fi-FI" sz="2800" dirty="0"/>
-              <a:t> Microsoft products and </a:t>
-            </a:r>
-            <a:r>
-              <a:rPr lang="fi-FI" sz="2800" dirty="0" err="1"/>
-              <a:t>services</a:t>
-            </a:r>
+              <a:t> Microsoft products </a:t>
+            </a:r>
+            <a:r>
+              <a:rPr lang="fi-FI" sz="2800"/>
+              <a:t>and services</a:t>
+            </a:r>
+          </a:p>
+          <a:p>
             <a:endParaRPr lang="fi-FI" sz="2800" dirty="0"/>
           </a:p>
           <a:p>
             <a:r>
+              <a:rPr lang="fi-FI" sz="2800"/>
+              <a:t>4 keynotes</a:t>
+            </a:r>
+          </a:p>
+          <a:p>
+            <a:pPr lvl="1"/>
+            <a:r>
+              <a:rPr lang="fi-FI" sz="2400"/>
+              <a:t>Main keynote (Satya Nadella)</a:t>
+            </a:r>
+          </a:p>
+          <a:p>
+            <a:pPr lvl="1"/>
+            <a:r>
+              <a:rPr lang="fi-FI" sz="2400"/>
+              <a:t>Modern Workplace (Kirk Koenigsbauer)</a:t>
+            </a:r>
+          </a:p>
+          <a:p>
+            <a:pPr lvl="1"/>
+            <a:r>
+              <a:rPr lang="fi-FI" sz="2400"/>
+              <a:t>Business Applications (James Phillips)</a:t>
+            </a:r>
+          </a:p>
+          <a:p>
+            <a:pPr lvl="1"/>
+            <a:r>
+              <a:rPr lang="fi-FI" sz="2400"/>
+              <a:t>The Enterprise Cloud (Scott Guthrie)</a:t>
+            </a:r>
+          </a:p>
+          <a:p>
+            <a:pPr lvl="1"/>
+            <a:endParaRPr lang="fi-FI" sz="2400"/>
+          </a:p>
+          <a:p>
+            <a:r>
+              <a:rPr lang="fi-FI" sz="2800"/>
+              <a:t>Over 24000 attendees</a:t>
+            </a:r>
+          </a:p>
+          <a:p>
+            <a:r>
+              <a:rPr lang="fi-FI" sz="2800"/>
+              <a:t>Many </a:t>
+            </a:r>
+            <a:r>
               <a:rPr lang="fi-FI" sz="2800" dirty="0"/>
-              <a:t>2 </a:t>
-            </a:r>
-            <a:r>
-              <a:rPr lang="fi-FI" sz="2800" dirty="0" err="1"/>
-              <a:t>keynotes</a:t>
-            </a:r>
-            <a:r>
-              <a:rPr lang="fi-FI" sz="2800" dirty="0"/>
-              <a:t>, one for </a:t>
-            </a:r>
-            <a:r>
-              <a:rPr lang="fi-FI" sz="2800" dirty="0" err="1"/>
-              <a:t>Monday</a:t>
-            </a:r>
-            <a:r>
-              <a:rPr lang="fi-FI" sz="2800" dirty="0"/>
-              <a:t> and </a:t>
-            </a:r>
-            <a:r>
-              <a:rPr lang="fi-FI" sz="2800" dirty="0" err="1"/>
-              <a:t>another</a:t>
-            </a:r>
-            <a:r>
-              <a:rPr lang="fi-FI" sz="2800" dirty="0"/>
-              <a:t> for </a:t>
-            </a:r>
-            <a:r>
-              <a:rPr lang="fi-FI" sz="2800" dirty="0" err="1"/>
-              <a:t>Tuesday</a:t>
-            </a:r>
-            <a:endParaRPr lang="fi-FI" sz="2800" dirty="0"/>
-          </a:p>
-          <a:p>
-            <a:endParaRPr lang="fi-FI" sz="2800" dirty="0"/>
-          </a:p>
-          <a:p>
-            <a:r>
-              <a:rPr lang="fi-FI" sz="2800" dirty="0" err="1"/>
-              <a:t>Many</a:t>
-            </a:r>
-            <a:r>
-              <a:rPr lang="fi-FI" sz="2800" dirty="0"/>
-              <a:t> session </a:t>
+              <a:t>session </a:t>
             </a:r>
             <a:r>
               <a:rPr lang="fi-FI" sz="2800" dirty="0" err="1"/>
@@ -3646,7 +3648,7 @@
                                         <p:tgtEl>
                                           <p:spTgt spid="106">
                                             <p:txEl>
-                                              <p:pRg st="1" end="1"/>
+                                              <p:pRg st="2" end="2"/>
                                             </p:txEl>
                                           </p:spTgt>
                                         </p:tgtEl>
@@ -3664,7 +3666,7 @@
                                         <p:tgtEl>
                                           <p:spTgt spid="106">
                                             <p:txEl>
-                                              <p:pRg st="1" end="1"/>
+                                              <p:pRg st="2" end="2"/>
                                             </p:txEl>
                                           </p:spTgt>
                                         </p:tgtEl>
@@ -3707,7 +3709,7 @@
                                         <p:tgtEl>
                                           <p:spTgt spid="106">
                                             <p:txEl>
-                                              <p:pRg st="2" end="2"/>
+                                              <p:pRg st="3" end="3"/>
                                             </p:txEl>
                                           </p:spTgt>
                                         </p:tgtEl>
@@ -3725,7 +3727,7 @@
                                         <p:tgtEl>
                                           <p:spTgt spid="106">
                                             <p:txEl>
-                                              <p:pRg st="2" end="2"/>
+                                              <p:pRg st="3" end="3"/>
                                             </p:txEl>
                                           </p:spTgt>
                                         </p:tgtEl>
@@ -3862,6 +3864,250 @@
                       </p:childTnLst>
                     </p:cTn>
                   </p:par>
+                  <p:par>
+                    <p:cTn id="28" fill="hold">
+                      <p:stCondLst>
+                        <p:cond delay="indefinite"/>
+                      </p:stCondLst>
+                      <p:childTnLst>
+                        <p:par>
+                          <p:cTn id="29" fill="hold">
+                            <p:stCondLst>
+                              <p:cond delay="0"/>
+                            </p:stCondLst>
+                            <p:childTnLst>
+                              <p:par>
+                                <p:cTn id="30" presetID="10" presetClass="entr" presetSubtype="0" fill="hold" nodeType="clickEffect">
+                                  <p:stCondLst>
+                                    <p:cond delay="0"/>
+                                  </p:stCondLst>
+                                  <p:childTnLst>
+                                    <p:set>
+                                      <p:cBhvr>
+                                        <p:cTn id="31" dur="1" fill="hold">
+                                          <p:stCondLst>
+                                            <p:cond delay="0"/>
+                                          </p:stCondLst>
+                                        </p:cTn>
+                                        <p:tgtEl>
+                                          <p:spTgt spid="106">
+                                            <p:txEl>
+                                              <p:pRg st="6" end="6"/>
+                                            </p:txEl>
+                                          </p:spTgt>
+                                        </p:tgtEl>
+                                        <p:attrNameLst>
+                                          <p:attrName>style.visibility</p:attrName>
+                                        </p:attrNameLst>
+                                      </p:cBhvr>
+                                      <p:to>
+                                        <p:strVal val="visible"/>
+                                      </p:to>
+                                    </p:set>
+                                    <p:animEffect transition="in" filter="fade">
+                                      <p:cBhvr>
+                                        <p:cTn id="32" dur="500"/>
+                                        <p:tgtEl>
+                                          <p:spTgt spid="106">
+                                            <p:txEl>
+                                              <p:pRg st="6" end="6"/>
+                                            </p:txEl>
+                                          </p:spTgt>
+                                        </p:tgtEl>
+                                      </p:cBhvr>
+                                    </p:animEffect>
+                                  </p:childTnLst>
+                                </p:cTn>
+                              </p:par>
+                            </p:childTnLst>
+                          </p:cTn>
+                        </p:par>
+                      </p:childTnLst>
+                    </p:cTn>
+                  </p:par>
+                  <p:par>
+                    <p:cTn id="33" fill="hold">
+                      <p:stCondLst>
+                        <p:cond delay="indefinite"/>
+                      </p:stCondLst>
+                      <p:childTnLst>
+                        <p:par>
+                          <p:cTn id="34" fill="hold">
+                            <p:stCondLst>
+                              <p:cond delay="0"/>
+                            </p:stCondLst>
+                            <p:childTnLst>
+                              <p:par>
+                                <p:cTn id="35" presetID="10" presetClass="entr" presetSubtype="0" fill="hold" nodeType="clickEffect">
+                                  <p:stCondLst>
+                                    <p:cond delay="0"/>
+                                  </p:stCondLst>
+                                  <p:childTnLst>
+                                    <p:set>
+                                      <p:cBhvr>
+                                        <p:cTn id="36" dur="1" fill="hold">
+                                          <p:stCondLst>
+                                            <p:cond delay="0"/>
+                                          </p:stCondLst>
+                                        </p:cTn>
+                                        <p:tgtEl>
+                                          <p:spTgt spid="106">
+                                            <p:txEl>
+                                              <p:pRg st="8" end="8"/>
+                                            </p:txEl>
+                                          </p:spTgt>
+                                        </p:tgtEl>
+                                        <p:attrNameLst>
+                                          <p:attrName>style.visibility</p:attrName>
+                                        </p:attrNameLst>
+                                      </p:cBhvr>
+                                      <p:to>
+                                        <p:strVal val="visible"/>
+                                      </p:to>
+                                    </p:set>
+                                    <p:animEffect transition="in" filter="fade">
+                                      <p:cBhvr>
+                                        <p:cTn id="37" dur="500"/>
+                                        <p:tgtEl>
+                                          <p:spTgt spid="106">
+                                            <p:txEl>
+                                              <p:pRg st="8" end="8"/>
+                                            </p:txEl>
+                                          </p:spTgt>
+                                        </p:tgtEl>
+                                      </p:cBhvr>
+                                    </p:animEffect>
+                                  </p:childTnLst>
+                                </p:cTn>
+                              </p:par>
+                            </p:childTnLst>
+                          </p:cTn>
+                        </p:par>
+                      </p:childTnLst>
+                    </p:cTn>
+                  </p:par>
+                  <p:par>
+                    <p:cTn id="38" fill="hold">
+                      <p:stCondLst>
+                        <p:cond delay="indefinite"/>
+                      </p:stCondLst>
+                      <p:childTnLst>
+                        <p:par>
+                          <p:cTn id="39" fill="hold">
+                            <p:stCondLst>
+                              <p:cond delay="0"/>
+                            </p:stCondLst>
+                            <p:childTnLst>
+                              <p:par>
+                                <p:cTn id="40" presetID="10" presetClass="entr" presetSubtype="0" fill="hold" nodeType="clickEffect">
+                                  <p:stCondLst>
+                                    <p:cond delay="0"/>
+                                  </p:stCondLst>
+                                  <p:childTnLst>
+                                    <p:set>
+                                      <p:cBhvr>
+                                        <p:cTn id="41" dur="1" fill="hold">
+                                          <p:stCondLst>
+                                            <p:cond delay="0"/>
+                                          </p:stCondLst>
+                                        </p:cTn>
+                                        <p:tgtEl>
+                                          <p:spTgt spid="106">
+                                            <p:txEl>
+                                              <p:pRg st="9" end="9"/>
+                                            </p:txEl>
+                                          </p:spTgt>
+                                        </p:tgtEl>
+                                        <p:attrNameLst>
+                                          <p:attrName>style.visibility</p:attrName>
+                                        </p:attrNameLst>
+                                      </p:cBhvr>
+                                      <p:to>
+                                        <p:strVal val="visible"/>
+                                      </p:to>
+                                    </p:set>
+                                    <p:animEffect transition="in" filter="fade">
+                                      <p:cBhvr>
+                                        <p:cTn id="42" dur="500"/>
+                                        <p:tgtEl>
+                                          <p:spTgt spid="106">
+                                            <p:txEl>
+                                              <p:pRg st="9" end="9"/>
+                                            </p:txEl>
+                                          </p:spTgt>
+                                        </p:tgtEl>
+                                      </p:cBhvr>
+                                    </p:animEffect>
+                                  </p:childTnLst>
+                                </p:cTn>
+                              </p:par>
+                            </p:childTnLst>
+                          </p:cTn>
+                        </p:par>
+                      </p:childTnLst>
+                    </p:cTn>
+                  </p:par>
+                  <p:par>
+                    <p:cTn id="43" fill="hold">
+                      <p:stCondLst>
+                        <p:cond delay="indefinite"/>
+                      </p:stCondLst>
+                      <p:childTnLst>
+                        <p:par>
+                          <p:cTn id="44" fill="hold">
+                            <p:stCondLst>
+                              <p:cond delay="0"/>
+                            </p:stCondLst>
+                            <p:childTnLst>
+                              <p:par>
+                                <p:cTn id="45" presetID="10" presetClass="entr" presetSubtype="0" fill="hold" nodeType="clickEffect">
+                                  <p:stCondLst>
+                                    <p:cond delay="0"/>
+                                  </p:stCondLst>
+                                  <p:childTnLst>
+                                    <p:set>
+                                      <p:cBhvr>
+                                        <p:cTn id="46" dur="1" fill="hold">
+                                          <p:stCondLst>
+                                            <p:cond delay="0"/>
+                                          </p:stCondLst>
+                                        </p:cTn>
+                                        <p:tgtEl>
+                                          <p:spTgt spid="106">
+                                            <p:txEl>
+                                              <p:pRg st="10" end="10"/>
+                                            </p:txEl>
+                                          </p:spTgt>
+                                        </p:tgtEl>
+                                        <p:attrNameLst>
+                                          <p:attrName>style.visibility</p:attrName>
+                                        </p:attrNameLst>
+                                      </p:cBhvr>
+                                      <p:to>
+                                        <p:strVal val="visible"/>
+                                      </p:to>
+                                    </p:set>
+                                    <p:animEffect transition="in" filter="fade">
+                                      <p:cBhvr>
+                                        <p:cTn id="47" dur="500"/>
+                                        <p:tgtEl>
+                                          <p:spTgt spid="106">
+                                            <p:txEl>
+                                              <p:pRg st="10" end="10"/>
+                                            </p:txEl>
+                                          </p:spTgt>
+                                        </p:tgtEl>
+                                      </p:cBhvr>
+                                    </p:animEffect>
+                                  </p:childTnLst>
+                                </p:cTn>
+                              </p:par>
+                            </p:childTnLst>
+                          </p:cTn>
+                        </p:par>
+                      </p:childTnLst>
+                    </p:cTn>
+                  </p:par>
                 </p:childTnLst>
               </p:cTn>
               <p:prevCondLst>
@@ -3884,6 +4130,421 @@
       </p:par>
     </p:tnLst>
   </p:timing>
+</p:sld>
+</file>
+
+<file path=ppt/slides/slide5.xml><?xml version="1.0" encoding="utf-8"?>
+<p:sld xmlns:a="http://schemas.openxmlformats.org/drawingml/2006/main" xmlns:r="http://schemas.openxmlformats.org/officeDocument/2006/relationships" xmlns:p="http://schemas.openxmlformats.org/presentationml/2006/main">
+  <p:cSld>
+    <p:spTree>
+      <p:nvGrpSpPr>
+        <p:cNvPr id="1" name=""/>
+        <p:cNvGrpSpPr/>
+        <p:nvPr/>
+      </p:nvGrpSpPr>
+      <p:grpSpPr>
+        <a:xfrm>
+          <a:off x="0" y="0"/>
+          <a:ext cx="0" cy="0"/>
+          <a:chOff x="0" y="0"/>
+          <a:chExt cx="0" cy="0"/>
+        </a:xfrm>
+      </p:grpSpPr>
+      <p:sp>
+        <p:nvSpPr>
+          <p:cNvPr id="2" name="Title 1">
+            <a:extLst>
+              <a:ext uri="{FF2B5EF4-FFF2-40B4-BE49-F238E27FC236}">
+                <a16:creationId xmlns:a16="http://schemas.microsoft.com/office/drawing/2014/main" id="{F12823AE-A590-453F-8184-E8183D4AA12A}"/>
+              </a:ext>
+            </a:extLst>
+          </p:cNvPr>
+          <p:cNvSpPr>
+            <a:spLocks noGrp="1"/>
+          </p:cNvSpPr>
+          <p:nvPr>
+            <p:ph type="title"/>
+          </p:nvPr>
+        </p:nvSpPr>
+        <p:spPr/>
+        <p:txBody>
+          <a:bodyPr/>
+          <a:lstStyle/>
+          <a:p>
+            <a:endParaRPr lang="en-GB"/>
+          </a:p>
+        </p:txBody>
+      </p:sp>
+      <p:sp>
+        <p:nvSpPr>
+          <p:cNvPr id="3" name="Text Placeholder 2">
+            <a:extLst>
+              <a:ext uri="{FF2B5EF4-FFF2-40B4-BE49-F238E27FC236}">
+                <a16:creationId xmlns:a16="http://schemas.microsoft.com/office/drawing/2014/main" id="{D02414D4-320C-4D5B-9786-2A7D389830A0}"/>
+              </a:ext>
+            </a:extLst>
+          </p:cNvPr>
+          <p:cNvSpPr>
+            <a:spLocks noGrp="1"/>
+          </p:cNvSpPr>
+          <p:nvPr>
+            <p:ph type="body" sz="quarter" idx="10"/>
+          </p:nvPr>
+        </p:nvSpPr>
+        <p:spPr/>
+        <p:txBody>
+          <a:bodyPr/>
+          <a:lstStyle/>
+          <a:p>
+            <a:endParaRPr lang="en-GB"/>
+          </a:p>
+        </p:txBody>
+      </p:sp>
+    </p:spTree>
+    <p:extLst>
+      <p:ext uri="{BB962C8B-B14F-4D97-AF65-F5344CB8AC3E}">
+        <p14:creationId xmlns:p14="http://schemas.microsoft.com/office/powerpoint/2010/main" val="2230601933"/>
+      </p:ext>
+    </p:extLst>
+  </p:cSld>
+  <p:clrMapOvr>
+    <a:masterClrMapping/>
+  </p:clrMapOvr>
+  <p:transition>
+    <p:fade/>
+  </p:transition>
+</p:sld>
+</file>
+
+<file path=ppt/slides/slide6.xml><?xml version="1.0" encoding="utf-8"?>
+<p:sld xmlns:a="http://schemas.openxmlformats.org/drawingml/2006/main" xmlns:r="http://schemas.openxmlformats.org/officeDocument/2006/relationships" xmlns:p="http://schemas.openxmlformats.org/presentationml/2006/main">
+  <p:cSld>
+    <p:spTree>
+      <p:nvGrpSpPr>
+        <p:cNvPr id="1" name=""/>
+        <p:cNvGrpSpPr/>
+        <p:nvPr/>
+      </p:nvGrpSpPr>
+      <p:grpSpPr>
+        <a:xfrm>
+          <a:off x="0" y="0"/>
+          <a:ext cx="0" cy="0"/>
+          <a:chOff x="0" y="0"/>
+          <a:chExt cx="0" cy="0"/>
+        </a:xfrm>
+      </p:grpSpPr>
+      <p:sp>
+        <p:nvSpPr>
+          <p:cNvPr id="2" name="Title 1">
+            <a:extLst>
+              <a:ext uri="{FF2B5EF4-FFF2-40B4-BE49-F238E27FC236}">
+                <a16:creationId xmlns:a16="http://schemas.microsoft.com/office/drawing/2014/main" id="{1371D837-10FD-4D32-A7F3-C4B6AD431872}"/>
+              </a:ext>
+            </a:extLst>
+          </p:cNvPr>
+          <p:cNvSpPr>
+            <a:spLocks noGrp="1"/>
+          </p:cNvSpPr>
+          <p:nvPr>
+            <p:ph type="title"/>
+          </p:nvPr>
+        </p:nvSpPr>
+        <p:spPr/>
+        <p:txBody>
+          <a:bodyPr/>
+          <a:lstStyle/>
+          <a:p>
+            <a:endParaRPr lang="en-GB"/>
+          </a:p>
+        </p:txBody>
+      </p:sp>
+      <p:sp>
+        <p:nvSpPr>
+          <p:cNvPr id="3" name="Text Placeholder 2">
+            <a:extLst>
+              <a:ext uri="{FF2B5EF4-FFF2-40B4-BE49-F238E27FC236}">
+                <a16:creationId xmlns:a16="http://schemas.microsoft.com/office/drawing/2014/main" id="{AF0A3049-9420-4959-A273-A2FED2282C7F}"/>
+              </a:ext>
+            </a:extLst>
+          </p:cNvPr>
+          <p:cNvSpPr>
+            <a:spLocks noGrp="1"/>
+          </p:cNvSpPr>
+          <p:nvPr>
+            <p:ph type="body" sz="quarter" idx="10"/>
+          </p:nvPr>
+        </p:nvSpPr>
+        <p:spPr/>
+        <p:txBody>
+          <a:bodyPr/>
+          <a:lstStyle/>
+          <a:p>
+            <a:endParaRPr lang="en-GB"/>
+          </a:p>
+        </p:txBody>
+      </p:sp>
+    </p:spTree>
+    <p:extLst>
+      <p:ext uri="{BB962C8B-B14F-4D97-AF65-F5344CB8AC3E}">
+        <p14:creationId xmlns:p14="http://schemas.microsoft.com/office/powerpoint/2010/main" val="2062112513"/>
+      </p:ext>
+    </p:extLst>
+  </p:cSld>
+  <p:clrMapOvr>
+    <a:masterClrMapping/>
+  </p:clrMapOvr>
+  <p:transition>
+    <p:fade/>
+  </p:transition>
+</p:sld>
+</file>
+
+<file path=ppt/slides/slide7.xml><?xml version="1.0" encoding="utf-8"?>
+<p:sld xmlns:a="http://schemas.openxmlformats.org/drawingml/2006/main" xmlns:r="http://schemas.openxmlformats.org/officeDocument/2006/relationships" xmlns:p="http://schemas.openxmlformats.org/presentationml/2006/main">
+  <p:cSld>
+    <p:spTree>
+      <p:nvGrpSpPr>
+        <p:cNvPr id="1" name=""/>
+        <p:cNvGrpSpPr/>
+        <p:nvPr/>
+      </p:nvGrpSpPr>
+      <p:grpSpPr>
+        <a:xfrm>
+          <a:off x="0" y="0"/>
+          <a:ext cx="0" cy="0"/>
+          <a:chOff x="0" y="0"/>
+          <a:chExt cx="0" cy="0"/>
+        </a:xfrm>
+      </p:grpSpPr>
+      <p:sp>
+        <p:nvSpPr>
+          <p:cNvPr id="2" name="Title 1">
+            <a:extLst>
+              <a:ext uri="{FF2B5EF4-FFF2-40B4-BE49-F238E27FC236}">
+                <a16:creationId xmlns:a16="http://schemas.microsoft.com/office/drawing/2014/main" id="{79948161-D74E-400D-8C2B-EB75B86ACCCE}"/>
+              </a:ext>
+            </a:extLst>
+          </p:cNvPr>
+          <p:cNvSpPr>
+            <a:spLocks noGrp="1"/>
+          </p:cNvSpPr>
+          <p:nvPr>
+            <p:ph type="title"/>
+          </p:nvPr>
+        </p:nvSpPr>
+        <p:spPr/>
+        <p:txBody>
+          <a:bodyPr/>
+          <a:lstStyle/>
+          <a:p>
+            <a:endParaRPr lang="en-GB"/>
+          </a:p>
+        </p:txBody>
+      </p:sp>
+      <p:sp>
+        <p:nvSpPr>
+          <p:cNvPr id="3" name="Text Placeholder 2">
+            <a:extLst>
+              <a:ext uri="{FF2B5EF4-FFF2-40B4-BE49-F238E27FC236}">
+                <a16:creationId xmlns:a16="http://schemas.microsoft.com/office/drawing/2014/main" id="{BD15ECA4-01BC-428A-ACEE-0BD8CBB120C2}"/>
+              </a:ext>
+            </a:extLst>
+          </p:cNvPr>
+          <p:cNvSpPr>
+            <a:spLocks noGrp="1"/>
+          </p:cNvSpPr>
+          <p:nvPr>
+            <p:ph type="body" sz="quarter" idx="10"/>
+          </p:nvPr>
+        </p:nvSpPr>
+        <p:spPr/>
+        <p:txBody>
+          <a:bodyPr/>
+          <a:lstStyle/>
+          <a:p>
+            <a:endParaRPr lang="en-GB"/>
+          </a:p>
+        </p:txBody>
+      </p:sp>
+    </p:spTree>
+    <p:extLst>
+      <p:ext uri="{BB962C8B-B14F-4D97-AF65-F5344CB8AC3E}">
+        <p14:creationId xmlns:p14="http://schemas.microsoft.com/office/powerpoint/2010/main" val="4272301862"/>
+      </p:ext>
+    </p:extLst>
+  </p:cSld>
+  <p:clrMapOvr>
+    <a:masterClrMapping/>
+  </p:clrMapOvr>
+  <p:transition>
+    <p:fade/>
+  </p:transition>
+</p:sld>
+</file>
+
+<file path=ppt/slides/slide8.xml><?xml version="1.0" encoding="utf-8"?>
+<p:sld xmlns:a="http://schemas.openxmlformats.org/drawingml/2006/main" xmlns:r="http://schemas.openxmlformats.org/officeDocument/2006/relationships" xmlns:p="http://schemas.openxmlformats.org/presentationml/2006/main">
+  <p:cSld>
+    <p:spTree>
+      <p:nvGrpSpPr>
+        <p:cNvPr id="1" name=""/>
+        <p:cNvGrpSpPr/>
+        <p:nvPr/>
+      </p:nvGrpSpPr>
+      <p:grpSpPr>
+        <a:xfrm>
+          <a:off x="0" y="0"/>
+          <a:ext cx="0" cy="0"/>
+          <a:chOff x="0" y="0"/>
+          <a:chExt cx="0" cy="0"/>
+        </a:xfrm>
+      </p:grpSpPr>
+      <p:sp>
+        <p:nvSpPr>
+          <p:cNvPr id="2" name="Title 1">
+            <a:extLst>
+              <a:ext uri="{FF2B5EF4-FFF2-40B4-BE49-F238E27FC236}">
+                <a16:creationId xmlns:a16="http://schemas.microsoft.com/office/drawing/2014/main" id="{79948161-D74E-400D-8C2B-EB75B86ACCCE}"/>
+              </a:ext>
+            </a:extLst>
+          </p:cNvPr>
+          <p:cNvSpPr>
+            <a:spLocks noGrp="1"/>
+          </p:cNvSpPr>
+          <p:nvPr>
+            <p:ph type="title"/>
+          </p:nvPr>
+        </p:nvSpPr>
+        <p:spPr/>
+        <p:txBody>
+          <a:bodyPr/>
+          <a:lstStyle/>
+          <a:p>
+            <a:endParaRPr lang="en-GB"/>
+          </a:p>
+        </p:txBody>
+      </p:sp>
+      <p:sp>
+        <p:nvSpPr>
+          <p:cNvPr id="3" name="Text Placeholder 2">
+            <a:extLst>
+              <a:ext uri="{FF2B5EF4-FFF2-40B4-BE49-F238E27FC236}">
+                <a16:creationId xmlns:a16="http://schemas.microsoft.com/office/drawing/2014/main" id="{BD15ECA4-01BC-428A-ACEE-0BD8CBB120C2}"/>
+              </a:ext>
+            </a:extLst>
+          </p:cNvPr>
+          <p:cNvSpPr>
+            <a:spLocks noGrp="1"/>
+          </p:cNvSpPr>
+          <p:nvPr>
+            <p:ph type="body" sz="quarter" idx="10"/>
+          </p:nvPr>
+        </p:nvSpPr>
+        <p:spPr/>
+        <p:txBody>
+          <a:bodyPr/>
+          <a:lstStyle/>
+          <a:p>
+            <a:endParaRPr lang="en-GB"/>
+          </a:p>
+        </p:txBody>
+      </p:sp>
+    </p:spTree>
+    <p:extLst>
+      <p:ext uri="{BB962C8B-B14F-4D97-AF65-F5344CB8AC3E}">
+        <p14:creationId xmlns:p14="http://schemas.microsoft.com/office/powerpoint/2010/main" val="275123593"/>
+      </p:ext>
+    </p:extLst>
+  </p:cSld>
+  <p:clrMapOvr>
+    <a:masterClrMapping/>
+  </p:clrMapOvr>
+  <p:transition>
+    <p:fade/>
+  </p:transition>
+</p:sld>
+</file>
+
+<file path=ppt/slides/slide9.xml><?xml version="1.0" encoding="utf-8"?>
+<p:sld xmlns:a="http://schemas.openxmlformats.org/drawingml/2006/main" xmlns:r="http://schemas.openxmlformats.org/officeDocument/2006/relationships" xmlns:p="http://schemas.openxmlformats.org/presentationml/2006/main">
+  <p:cSld>
+    <p:spTree>
+      <p:nvGrpSpPr>
+        <p:cNvPr id="1" name=""/>
+        <p:cNvGrpSpPr/>
+        <p:nvPr/>
+      </p:nvGrpSpPr>
+      <p:grpSpPr>
+        <a:xfrm>
+          <a:off x="0" y="0"/>
+          <a:ext cx="0" cy="0"/>
+          <a:chOff x="0" y="0"/>
+          <a:chExt cx="0" cy="0"/>
+        </a:xfrm>
+      </p:grpSpPr>
+      <p:sp>
+        <p:nvSpPr>
+          <p:cNvPr id="2" name="Title 1">
+            <a:extLst>
+              <a:ext uri="{FF2B5EF4-FFF2-40B4-BE49-F238E27FC236}">
+                <a16:creationId xmlns:a16="http://schemas.microsoft.com/office/drawing/2014/main" id="{9FA9B5AB-F889-4531-AD7D-C7661F395A5C}"/>
+              </a:ext>
+            </a:extLst>
+          </p:cNvPr>
+          <p:cNvSpPr>
+            <a:spLocks noGrp="1"/>
+          </p:cNvSpPr>
+          <p:nvPr>
+            <p:ph type="title"/>
+          </p:nvPr>
+        </p:nvSpPr>
+        <p:spPr/>
+        <p:txBody>
+          <a:bodyPr/>
+          <a:lstStyle/>
+          <a:p>
+            <a:endParaRPr lang="en-GB"/>
+          </a:p>
+        </p:txBody>
+      </p:sp>
+      <p:sp>
+        <p:nvSpPr>
+          <p:cNvPr id="3" name="Text Placeholder 2">
+            <a:extLst>
+              <a:ext uri="{FF2B5EF4-FFF2-40B4-BE49-F238E27FC236}">
+                <a16:creationId xmlns:a16="http://schemas.microsoft.com/office/drawing/2014/main" id="{AB3751F9-731B-4B3D-B481-5A5D084B12DC}"/>
+              </a:ext>
+            </a:extLst>
+          </p:cNvPr>
+          <p:cNvSpPr>
+            <a:spLocks noGrp="1"/>
+          </p:cNvSpPr>
+          <p:nvPr>
+            <p:ph type="body" sz="quarter" idx="10"/>
+          </p:nvPr>
+        </p:nvSpPr>
+        <p:spPr/>
+        <p:txBody>
+          <a:bodyPr/>
+          <a:lstStyle/>
+          <a:p>
+            <a:endParaRPr lang="en-GB"/>
+          </a:p>
+        </p:txBody>
+      </p:sp>
+    </p:spTree>
+    <p:extLst>
+      <p:ext uri="{BB962C8B-B14F-4D97-AF65-F5344CB8AC3E}">
+        <p14:creationId xmlns:p14="http://schemas.microsoft.com/office/powerpoint/2010/main" val="3555972481"/>
+      </p:ext>
+    </p:extLst>
+  </p:cSld>
+  <p:clrMapOvr>
+    <a:masterClrMapping/>
+  </p:clrMapOvr>
+  <p:transition>
+    <p:fade/>
+  </p:transition>
 </p:sld>
 </file>
 

</xml_diff>